<commit_message>
TW edits, including make links open in new tabs
</commit_message>
<xml_diff>
--- a/docs/deployment_guide/images/architecture_diagram.pptx
+++ b/docs/deployment_guide/images/architecture_diagram.pptx
@@ -243,7 +243,7 @@
           <a:p>
             <a:fld id="{978E1701-DB6D-42CE-BF68-F59CF5B67295}" type="datetimeFigureOut">
               <a:rPr lang="en-US" smtClean="0"/>
-              <a:t>7/25/2022</a:t>
+              <a:t>8/3/2022</a:t>
             </a:fld>
             <a:endParaRPr lang="en-US"/>
           </a:p>
@@ -413,7 +413,7 @@
           <a:p>
             <a:fld id="{978E1701-DB6D-42CE-BF68-F59CF5B67295}" type="datetimeFigureOut">
               <a:rPr lang="en-US" smtClean="0"/>
-              <a:t>7/25/2022</a:t>
+              <a:t>8/3/2022</a:t>
             </a:fld>
             <a:endParaRPr lang="en-US"/>
           </a:p>
@@ -593,7 +593,7 @@
           <a:p>
             <a:fld id="{978E1701-DB6D-42CE-BF68-F59CF5B67295}" type="datetimeFigureOut">
               <a:rPr lang="en-US" smtClean="0"/>
-              <a:t>7/25/2022</a:t>
+              <a:t>8/3/2022</a:t>
             </a:fld>
             <a:endParaRPr lang="en-US"/>
           </a:p>
@@ -763,7 +763,7 @@
           <a:p>
             <a:fld id="{978E1701-DB6D-42CE-BF68-F59CF5B67295}" type="datetimeFigureOut">
               <a:rPr lang="en-US" smtClean="0"/>
-              <a:t>7/25/2022</a:t>
+              <a:t>8/3/2022</a:t>
             </a:fld>
             <a:endParaRPr lang="en-US"/>
           </a:p>
@@ -1007,7 +1007,7 @@
           <a:p>
             <a:fld id="{978E1701-DB6D-42CE-BF68-F59CF5B67295}" type="datetimeFigureOut">
               <a:rPr lang="en-US" smtClean="0"/>
-              <a:t>7/25/2022</a:t>
+              <a:t>8/3/2022</a:t>
             </a:fld>
             <a:endParaRPr lang="en-US"/>
           </a:p>
@@ -1239,7 +1239,7 @@
           <a:p>
             <a:fld id="{978E1701-DB6D-42CE-BF68-F59CF5B67295}" type="datetimeFigureOut">
               <a:rPr lang="en-US" smtClean="0"/>
-              <a:t>7/25/2022</a:t>
+              <a:t>8/3/2022</a:t>
             </a:fld>
             <a:endParaRPr lang="en-US"/>
           </a:p>
@@ -1606,7 +1606,7 @@
           <a:p>
             <a:fld id="{978E1701-DB6D-42CE-BF68-F59CF5B67295}" type="datetimeFigureOut">
               <a:rPr lang="en-US" smtClean="0"/>
-              <a:t>7/25/2022</a:t>
+              <a:t>8/3/2022</a:t>
             </a:fld>
             <a:endParaRPr lang="en-US"/>
           </a:p>
@@ -1724,7 +1724,7 @@
           <a:p>
             <a:fld id="{978E1701-DB6D-42CE-BF68-F59CF5B67295}" type="datetimeFigureOut">
               <a:rPr lang="en-US" smtClean="0"/>
-              <a:t>7/25/2022</a:t>
+              <a:t>8/3/2022</a:t>
             </a:fld>
             <a:endParaRPr lang="en-US"/>
           </a:p>
@@ -1819,7 +1819,7 @@
           <a:p>
             <a:fld id="{978E1701-DB6D-42CE-BF68-F59CF5B67295}" type="datetimeFigureOut">
               <a:rPr lang="en-US" smtClean="0"/>
-              <a:t>7/25/2022</a:t>
+              <a:t>8/3/2022</a:t>
             </a:fld>
             <a:endParaRPr lang="en-US"/>
           </a:p>
@@ -2096,7 +2096,7 @@
           <a:p>
             <a:fld id="{978E1701-DB6D-42CE-BF68-F59CF5B67295}" type="datetimeFigureOut">
               <a:rPr lang="en-US" smtClean="0"/>
-              <a:t>7/25/2022</a:t>
+              <a:t>8/3/2022</a:t>
             </a:fld>
             <a:endParaRPr lang="en-US"/>
           </a:p>
@@ -2353,7 +2353,7 @@
           <a:p>
             <a:fld id="{978E1701-DB6D-42CE-BF68-F59CF5B67295}" type="datetimeFigureOut">
               <a:rPr lang="en-US" smtClean="0"/>
-              <a:t>7/25/2022</a:t>
+              <a:t>8/3/2022</a:t>
             </a:fld>
             <a:endParaRPr lang="en-US"/>
           </a:p>
@@ -2566,7 +2566,7 @@
           <a:p>
             <a:fld id="{978E1701-DB6D-42CE-BF68-F59CF5B67295}" type="datetimeFigureOut">
               <a:rPr lang="en-US" smtClean="0"/>
-              <a:t>7/25/2022</a:t>
+              <a:t>8/3/2022</a:t>
             </a:fld>
             <a:endParaRPr lang="en-US"/>
           </a:p>
@@ -4934,13 +4934,18 @@
           <a:p>
             <a:pPr algn="ctr" eaLnBrk="1" hangingPunct="1"/>
             <a:r>
-              <a:rPr lang="en-US" altLang="en-US" sz="1100" dirty="0">
+              <a:rPr lang="en-US" altLang="en-US" sz="1100" dirty="0" err="1">
                 <a:latin typeface="Arial" panose="020B0604020202020204" pitchFamily="34" charset="0"/>
                 <a:ea typeface="Amazon Ember" panose="020B0603020204020204" pitchFamily="34" charset="0"/>
                 <a:cs typeface="Arial" panose="020B0604020202020204" pitchFamily="34" charset="0"/>
               </a:rPr>
-              <a:t>Virtual Edge</a:t>
-            </a:r>
+              <a:t>vEdge</a:t>
+            </a:r>
+            <a:endParaRPr lang="en-US" altLang="en-US" sz="1100" dirty="0">
+              <a:latin typeface="Arial" panose="020B0604020202020204" pitchFamily="34" charset="0"/>
+              <a:ea typeface="Amazon Ember" panose="020B0603020204020204" pitchFamily="34" charset="0"/>
+              <a:cs typeface="Arial" panose="020B0604020202020204" pitchFamily="34" charset="0"/>
+            </a:endParaRPr>
           </a:p>
         </p:txBody>
       </p:sp>
@@ -5166,13 +5171,18 @@
           <a:p>
             <a:pPr algn="ctr" eaLnBrk="1" hangingPunct="1"/>
             <a:r>
-              <a:rPr lang="en-US" altLang="en-US" sz="1100" dirty="0">
+              <a:rPr lang="en-US" altLang="en-US" sz="1100" dirty="0" err="1">
                 <a:latin typeface="Arial" panose="020B0604020202020204" pitchFamily="34" charset="0"/>
                 <a:ea typeface="Amazon Ember" panose="020B0603020204020204" pitchFamily="34" charset="0"/>
                 <a:cs typeface="Arial" panose="020B0604020202020204" pitchFamily="34" charset="0"/>
               </a:rPr>
-              <a:t>Virtual Edge</a:t>
-            </a:r>
+              <a:t>vEdge</a:t>
+            </a:r>
+            <a:endParaRPr lang="en-US" altLang="en-US" sz="1100" dirty="0">
+              <a:latin typeface="Arial" panose="020B0604020202020204" pitchFamily="34" charset="0"/>
+              <a:ea typeface="Amazon Ember" panose="020B0603020204020204" pitchFamily="34" charset="0"/>
+              <a:cs typeface="Arial" panose="020B0604020202020204" pitchFamily="34" charset="0"/>
+            </a:endParaRPr>
           </a:p>
         </p:txBody>
       </p:sp>
@@ -5192,7 +5202,7 @@
         </p:nvSpPr>
         <p:spPr bwMode="auto">
           <a:xfrm>
-            <a:off x="5391132" y="6162243"/>
+            <a:off x="5378696" y="6162243"/>
             <a:ext cx="1426282" cy="261610"/>
           </a:xfrm>
           <a:prstGeom prst="rect">
@@ -5364,226 +5374,7 @@
         </p:blipFill>
         <p:spPr bwMode="auto">
           <a:xfrm>
-            <a:off x="5866012" y="5709935"/>
-            <a:ext cx="457200" cy="457200"/>
-          </a:xfrm>
-          <a:prstGeom prst="rect">
-            <a:avLst/>
-          </a:prstGeom>
-          <a:noFill/>
-          <a:ln>
-            <a:noFill/>
-          </a:ln>
-          <a:extLst>
-            <a:ext uri="{909E8E84-426E-40DD-AFC4-6F175D3DCCD1}">
-              <a14:hiddenFill xmlns:a14="http://schemas.microsoft.com/office/drawing/2010/main">
-                <a:solidFill>
-                  <a:srgbClr val="FFFFFF"/>
-                </a:solidFill>
-              </a14:hiddenFill>
-            </a:ext>
-            <a:ext uri="{91240B29-F687-4F45-9708-019B960494DF}">
-              <a14:hiddenLine xmlns:a14="http://schemas.microsoft.com/office/drawing/2010/main" w="9525">
-                <a:solidFill>
-                  <a:srgbClr val="000000"/>
-                </a:solidFill>
-                <a:miter lim="800000"/>
-                <a:headEnd/>
-                <a:tailEnd/>
-              </a14:hiddenLine>
-            </a:ext>
-          </a:extLst>
-        </p:spPr>
-      </p:pic>
-      <p:sp>
-        <p:nvSpPr>
-          <p:cNvPr id="91" name="TextBox 15">
-            <a:extLst>
-              <a:ext uri="{FF2B5EF4-FFF2-40B4-BE49-F238E27FC236}">
-                <a16:creationId xmlns:a16="http://schemas.microsoft.com/office/drawing/2014/main" id="{384B3592-8CE3-432D-A098-7E87473AA433}"/>
-              </a:ext>
-            </a:extLst>
-          </p:cNvPr>
-          <p:cNvSpPr txBox="1">
-            <a:spLocks noChangeArrowheads="1"/>
-          </p:cNvSpPr>
-          <p:nvPr/>
-        </p:nvSpPr>
-        <p:spPr bwMode="auto">
-          <a:xfrm>
-            <a:off x="8729654" y="6162243"/>
-            <a:ext cx="1459478" cy="261610"/>
-          </a:xfrm>
-          <a:prstGeom prst="rect">
-            <a:avLst/>
-          </a:prstGeom>
-          <a:noFill/>
-          <a:ln>
-            <a:noFill/>
-          </a:ln>
-          <a:extLst>
-            <a:ext uri="{909E8E84-426E-40DD-AFC4-6F175D3DCCD1}">
-              <a14:hiddenFill xmlns:a14="http://schemas.microsoft.com/office/drawing/2010/main">
-                <a:solidFill>
-                  <a:srgbClr val="FFFFFF"/>
-                </a:solidFill>
-              </a14:hiddenFill>
-            </a:ext>
-            <a:ext uri="{91240B29-F687-4F45-9708-019B960494DF}">
-              <a14:hiddenLine xmlns:a14="http://schemas.microsoft.com/office/drawing/2010/main" w="9525">
-                <a:solidFill>
-                  <a:srgbClr val="000000"/>
-                </a:solidFill>
-                <a:miter lim="800000"/>
-                <a:headEnd/>
-                <a:tailEnd/>
-              </a14:hiddenLine>
-            </a:ext>
-          </a:extLst>
-        </p:spPr>
-        <p:txBody>
-          <a:bodyPr wrap="square">
-            <a:spAutoFit/>
-          </a:bodyPr>
-          <a:lstStyle>
-            <a:lvl1pPr>
-              <a:defRPr>
-                <a:solidFill>
-                  <a:schemeClr val="tx1"/>
-                </a:solidFill>
-                <a:latin typeface="Calibri" panose="020F0502020204030204" pitchFamily="34" charset="0"/>
-              </a:defRPr>
-            </a:lvl1pPr>
-            <a:lvl2pPr marL="742950" indent="-285750">
-              <a:defRPr>
-                <a:solidFill>
-                  <a:schemeClr val="tx1"/>
-                </a:solidFill>
-                <a:latin typeface="Calibri" panose="020F0502020204030204" pitchFamily="34" charset="0"/>
-              </a:defRPr>
-            </a:lvl2pPr>
-            <a:lvl3pPr marL="1143000" indent="-228600">
-              <a:defRPr>
-                <a:solidFill>
-                  <a:schemeClr val="tx1"/>
-                </a:solidFill>
-                <a:latin typeface="Calibri" panose="020F0502020204030204" pitchFamily="34" charset="0"/>
-              </a:defRPr>
-            </a:lvl3pPr>
-            <a:lvl4pPr marL="1600200" indent="-228600">
-              <a:defRPr>
-                <a:solidFill>
-                  <a:schemeClr val="tx1"/>
-                </a:solidFill>
-                <a:latin typeface="Calibri" panose="020F0502020204030204" pitchFamily="34" charset="0"/>
-              </a:defRPr>
-            </a:lvl4pPr>
-            <a:lvl5pPr marL="2057400" indent="-228600">
-              <a:defRPr>
-                <a:solidFill>
-                  <a:schemeClr val="tx1"/>
-                </a:solidFill>
-                <a:latin typeface="Calibri" panose="020F0502020204030204" pitchFamily="34" charset="0"/>
-              </a:defRPr>
-            </a:lvl5pPr>
-            <a:lvl6pPr marL="2514600" indent="-228600" eaLnBrk="0" fontAlgn="base" hangingPunct="0">
-              <a:spcBef>
-                <a:spcPct val="0"/>
-              </a:spcBef>
-              <a:spcAft>
-                <a:spcPct val="0"/>
-              </a:spcAft>
-              <a:defRPr>
-                <a:solidFill>
-                  <a:schemeClr val="tx1"/>
-                </a:solidFill>
-                <a:latin typeface="Calibri" panose="020F0502020204030204" pitchFamily="34" charset="0"/>
-              </a:defRPr>
-            </a:lvl6pPr>
-            <a:lvl7pPr marL="2971800" indent="-228600" eaLnBrk="0" fontAlgn="base" hangingPunct="0">
-              <a:spcBef>
-                <a:spcPct val="0"/>
-              </a:spcBef>
-              <a:spcAft>
-                <a:spcPct val="0"/>
-              </a:spcAft>
-              <a:defRPr>
-                <a:solidFill>
-                  <a:schemeClr val="tx1"/>
-                </a:solidFill>
-                <a:latin typeface="Calibri" panose="020F0502020204030204" pitchFamily="34" charset="0"/>
-              </a:defRPr>
-            </a:lvl7pPr>
-            <a:lvl8pPr marL="3429000" indent="-228600" eaLnBrk="0" fontAlgn="base" hangingPunct="0">
-              <a:spcBef>
-                <a:spcPct val="0"/>
-              </a:spcBef>
-              <a:spcAft>
-                <a:spcPct val="0"/>
-              </a:spcAft>
-              <a:defRPr>
-                <a:solidFill>
-                  <a:schemeClr val="tx1"/>
-                </a:solidFill>
-                <a:latin typeface="Calibri" panose="020F0502020204030204" pitchFamily="34" charset="0"/>
-              </a:defRPr>
-            </a:lvl8pPr>
-            <a:lvl9pPr marL="3886200" indent="-228600" eaLnBrk="0" fontAlgn="base" hangingPunct="0">
-              <a:spcBef>
-                <a:spcPct val="0"/>
-              </a:spcBef>
-              <a:spcAft>
-                <a:spcPct val="0"/>
-              </a:spcAft>
-              <a:defRPr>
-                <a:solidFill>
-                  <a:schemeClr val="tx1"/>
-                </a:solidFill>
-                <a:latin typeface="Calibri" panose="020F0502020204030204" pitchFamily="34" charset="0"/>
-              </a:defRPr>
-            </a:lvl9pPr>
-          </a:lstStyle>
-          <a:p>
-            <a:pPr algn="ctr" eaLnBrk="1" hangingPunct="1"/>
-            <a:r>
-              <a:rPr lang="en-US" altLang="en-US" sz="1100" dirty="0">
-                <a:latin typeface="Arial" panose="020B0604020202020204" pitchFamily="34" charset="0"/>
-                <a:ea typeface="Amazon Ember" panose="020B0603020204020204" pitchFamily="34" charset="0"/>
-                <a:cs typeface="Arial" panose="020B0604020202020204" pitchFamily="34" charset="0"/>
-              </a:rPr>
-              <a:t>Segment network 2</a:t>
-            </a:r>
-          </a:p>
-        </p:txBody>
-      </p:sp>
-      <p:pic>
-        <p:nvPicPr>
-          <p:cNvPr id="92" name="Graphic 6">
-            <a:extLst>
-              <a:ext uri="{FF2B5EF4-FFF2-40B4-BE49-F238E27FC236}">
-                <a16:creationId xmlns:a16="http://schemas.microsoft.com/office/drawing/2014/main" id="{8737FDA5-7A79-409D-A10E-DA0B73DF0F3B}"/>
-              </a:ext>
-            </a:extLst>
-          </p:cNvPr>
-          <p:cNvPicPr>
-            <a:picLocks noChangeAspect="1" noChangeArrowheads="1"/>
-          </p:cNvPicPr>
-          <p:nvPr/>
-        </p:nvPicPr>
-        <p:blipFill>
-          <a:blip r:embed="rId13">
-            <a:extLst>
-              <a:ext uri="{96DAC541-7B7A-43D3-8B79-37D633B846F1}">
-                <asvg:svgBlip xmlns:asvg="http://schemas.microsoft.com/office/drawing/2016/SVG/main" r:embed="rId14"/>
-              </a:ext>
-            </a:extLst>
-          </a:blip>
-          <a:srcRect/>
-          <a:stretch/>
-        </p:blipFill>
-        <p:spPr bwMode="auto">
-          <a:xfrm>
-            <a:off x="9231820" y="5705043"/>
+            <a:off x="5863237" y="5709935"/>
             <a:ext cx="457200" cy="457200"/>
           </a:xfrm>
           <a:prstGeom prst="rect">
@@ -6034,14 +5825,55 @@
               <a:defRPr/>
             </a:pPr>
             <a:r>
-              <a:rPr lang="en-US" sz="1200" dirty="0">
+              <a:rPr lang="en-US" sz="1200" dirty="0" err="1">
                 <a:solidFill>
                   <a:srgbClr val="5A6B86"/>
                 </a:solidFill>
                 <a:latin typeface="Arial" panose="020B0604020202020204" pitchFamily="34" charset="0"/>
                 <a:cs typeface="Arial" panose="020B0604020202020204" pitchFamily="34" charset="0"/>
               </a:rPr>
-              <a:t>Edge cluster</a:t>
+              <a:t>Vmware</a:t>
+            </a:r>
+            <a:r>
+              <a:rPr lang="en-US" sz="1200" dirty="0">
+                <a:solidFill>
+                  <a:srgbClr val="5A6B86"/>
+                </a:solidFill>
+                <a:latin typeface="Arial" panose="020B0604020202020204" pitchFamily="34" charset="0"/>
+                <a:cs typeface="Arial" panose="020B0604020202020204" pitchFamily="34" charset="0"/>
+              </a:rPr>
+              <a:t> SD-WAN</a:t>
+            </a:r>
+          </a:p>
+          <a:p>
+            <a:pPr algn="ctr" eaLnBrk="1" fontAlgn="auto" hangingPunct="1">
+              <a:spcBef>
+                <a:spcPts val="0"/>
+              </a:spcBef>
+              <a:spcAft>
+                <a:spcPts val="0"/>
+              </a:spcAft>
+              <a:defRPr/>
+            </a:pPr>
+            <a:r>
+              <a:rPr lang="en-US" sz="1200" dirty="0" err="1">
+                <a:solidFill>
+                  <a:srgbClr val="5A6B86"/>
+                </a:solidFill>
+                <a:latin typeface="Arial" panose="020B0604020202020204" pitchFamily="34" charset="0"/>
+                <a:cs typeface="Arial" panose="020B0604020202020204" pitchFamily="34" charset="0"/>
+              </a:rPr>
+              <a:t>vEdge</a:t>
+            </a:r>
+            <a:r>
+              <a:rPr lang="en-US" sz="1200" dirty="0">
+                <a:solidFill>
+                  <a:srgbClr val="5A6B86"/>
+                </a:solidFill>
+                <a:latin typeface="Arial" panose="020B0604020202020204" pitchFamily="34" charset="0"/>
+                <a:cs typeface="Arial" panose="020B0604020202020204" pitchFamily="34" charset="0"/>
+              </a:rPr>
+              <a:t> cluster</a:t>
             </a:r>
           </a:p>
         </p:txBody>
@@ -6232,7 +6064,7 @@
                 <a:ea typeface="Amazon Ember" panose="020B0603020204020204" pitchFamily="34" charset="0"/>
                 <a:cs typeface="Arial" panose="020B0604020202020204" pitchFamily="34" charset="0"/>
               </a:rPr>
-              <a:t>Full mesh</a:t>
+              <a:t>Full-mesh</a:t>
             </a:r>
           </a:p>
           <a:p>
@@ -6391,66 +6223,6 @@
           </a:p>
         </p:txBody>
       </p:sp>
-      <p:pic>
-        <p:nvPicPr>
-          <p:cNvPr id="210" name="Graphic 6">
-            <a:extLst>
-              <a:ext uri="{FF2B5EF4-FFF2-40B4-BE49-F238E27FC236}">
-                <a16:creationId xmlns:a16="http://schemas.microsoft.com/office/drawing/2014/main" id="{E41C5439-0351-49BB-9361-1578E080D870}"/>
-              </a:ext>
-            </a:extLst>
-          </p:cNvPr>
-          <p:cNvPicPr>
-            <a:picLocks noChangeAspect="1" noChangeArrowheads="1"/>
-          </p:cNvPicPr>
-          <p:nvPr/>
-        </p:nvPicPr>
-        <p:blipFill>
-          <a:blip r:embed="rId22">
-            <a:extLst>
-              <a:ext uri="{28A0092B-C50C-407E-A947-70E740481C1C}">
-                <a14:useLocalDpi xmlns:a14="http://schemas.microsoft.com/office/drawing/2010/main" val="0"/>
-              </a:ext>
-            </a:extLst>
-          </a:blip>
-          <a:srcRect/>
-          <a:stretch>
-            <a:fillRect/>
-          </a:stretch>
-        </p:blipFill>
-        <p:spPr bwMode="auto">
-          <a:xfrm>
-            <a:off x="5722829" y="7714948"/>
-            <a:ext cx="762000" cy="762000"/>
-          </a:xfrm>
-          <a:prstGeom prst="rect">
-            <a:avLst/>
-          </a:prstGeom>
-          <a:noFill/>
-          <a:ln>
-            <a:noFill/>
-          </a:ln>
-          <a:extLst>
-            <a:ext uri="{909E8E84-426E-40DD-AFC4-6F175D3DCCD1}">
-              <a14:hiddenFill xmlns:a14="http://schemas.microsoft.com/office/drawing/2010/main">
-                <a:solidFill>
-                  <a:srgbClr val="FFFFFF"/>
-                </a:solidFill>
-              </a14:hiddenFill>
-            </a:ext>
-            <a:ext uri="{91240B29-F687-4F45-9708-019B960494DF}">
-              <a14:hiddenLine xmlns:a14="http://schemas.microsoft.com/office/drawing/2010/main" w="9525">
-                <a:solidFill>
-                  <a:srgbClr val="000000"/>
-                </a:solidFill>
-                <a:miter lim="800000"/>
-                <a:headEnd/>
-                <a:tailEnd/>
-              </a14:hiddenLine>
-            </a:ext>
-          </a:extLst>
-        </p:spPr>
-      </p:pic>
       <p:sp>
         <p:nvSpPr>
           <p:cNvPr id="211" name="TextBox 9">
@@ -6467,7 +6239,7 @@
         </p:nvSpPr>
         <p:spPr bwMode="auto">
           <a:xfrm>
-            <a:off x="5366260" y="8481598"/>
+            <a:off x="5378696" y="8396542"/>
             <a:ext cx="1426282" cy="276999"/>
           </a:xfrm>
           <a:prstGeom prst="rect">
@@ -6608,227 +6380,6 @@
                 <a:cs typeface="Arial" panose="020B0604020202020204" pitchFamily="34" charset="0"/>
               </a:rPr>
               <a:t>Workload VPC 1</a:t>
-            </a:r>
-          </a:p>
-        </p:txBody>
-      </p:sp>
-      <p:pic>
-        <p:nvPicPr>
-          <p:cNvPr id="217" name="Graphic 6">
-            <a:extLst>
-              <a:ext uri="{FF2B5EF4-FFF2-40B4-BE49-F238E27FC236}">
-                <a16:creationId xmlns:a16="http://schemas.microsoft.com/office/drawing/2014/main" id="{22E1EFDC-FE88-427E-B08A-0B770DB3C936}"/>
-              </a:ext>
-            </a:extLst>
-          </p:cNvPr>
-          <p:cNvPicPr>
-            <a:picLocks noChangeAspect="1" noChangeArrowheads="1"/>
-          </p:cNvPicPr>
-          <p:nvPr/>
-        </p:nvPicPr>
-        <p:blipFill>
-          <a:blip r:embed="rId22">
-            <a:extLst>
-              <a:ext uri="{28A0092B-C50C-407E-A947-70E740481C1C}">
-                <a14:useLocalDpi xmlns:a14="http://schemas.microsoft.com/office/drawing/2010/main" val="0"/>
-              </a:ext>
-            </a:extLst>
-          </a:blip>
-          <a:srcRect/>
-          <a:stretch>
-            <a:fillRect/>
-          </a:stretch>
-        </p:blipFill>
-        <p:spPr bwMode="auto">
-          <a:xfrm>
-            <a:off x="9085432" y="7732166"/>
-            <a:ext cx="762000" cy="762000"/>
-          </a:xfrm>
-          <a:prstGeom prst="rect">
-            <a:avLst/>
-          </a:prstGeom>
-          <a:noFill/>
-          <a:ln>
-            <a:noFill/>
-          </a:ln>
-          <a:extLst>
-            <a:ext uri="{909E8E84-426E-40DD-AFC4-6F175D3DCCD1}">
-              <a14:hiddenFill xmlns:a14="http://schemas.microsoft.com/office/drawing/2010/main">
-                <a:solidFill>
-                  <a:srgbClr val="FFFFFF"/>
-                </a:solidFill>
-              </a14:hiddenFill>
-            </a:ext>
-            <a:ext uri="{91240B29-F687-4F45-9708-019B960494DF}">
-              <a14:hiddenLine xmlns:a14="http://schemas.microsoft.com/office/drawing/2010/main" w="9525">
-                <a:solidFill>
-                  <a:srgbClr val="000000"/>
-                </a:solidFill>
-                <a:miter lim="800000"/>
-                <a:headEnd/>
-                <a:tailEnd/>
-              </a14:hiddenLine>
-            </a:ext>
-          </a:extLst>
-        </p:spPr>
-      </p:pic>
-      <p:sp>
-        <p:nvSpPr>
-          <p:cNvPr id="218" name="TextBox 9">
-            <a:extLst>
-              <a:ext uri="{FF2B5EF4-FFF2-40B4-BE49-F238E27FC236}">
-                <a16:creationId xmlns:a16="http://schemas.microsoft.com/office/drawing/2014/main" id="{40577857-59B0-4D53-97EC-003386BBEC6E}"/>
-              </a:ext>
-            </a:extLst>
-          </p:cNvPr>
-          <p:cNvSpPr txBox="1">
-            <a:spLocks noChangeArrowheads="1"/>
-          </p:cNvSpPr>
-          <p:nvPr/>
-        </p:nvSpPr>
-        <p:spPr bwMode="auto">
-          <a:xfrm>
-            <a:off x="8752260" y="8487016"/>
-            <a:ext cx="1426282" cy="276999"/>
-          </a:xfrm>
-          <a:prstGeom prst="rect">
-            <a:avLst/>
-          </a:prstGeom>
-          <a:noFill/>
-          <a:ln>
-            <a:noFill/>
-          </a:ln>
-          <a:extLst>
-            <a:ext uri="{909E8E84-426E-40DD-AFC4-6F175D3DCCD1}">
-              <a14:hiddenFill xmlns:a14="http://schemas.microsoft.com/office/drawing/2010/main">
-                <a:solidFill>
-                  <a:srgbClr val="FFFFFF"/>
-                </a:solidFill>
-              </a14:hiddenFill>
-            </a:ext>
-            <a:ext uri="{91240B29-F687-4F45-9708-019B960494DF}">
-              <a14:hiddenLine xmlns:a14="http://schemas.microsoft.com/office/drawing/2010/main" w="9525">
-                <a:solidFill>
-                  <a:srgbClr val="000000"/>
-                </a:solidFill>
-                <a:miter lim="800000"/>
-                <a:headEnd/>
-                <a:tailEnd/>
-              </a14:hiddenLine>
-            </a:ext>
-          </a:extLst>
-        </p:spPr>
-        <p:txBody>
-          <a:bodyPr wrap="square">
-            <a:spAutoFit/>
-          </a:bodyPr>
-          <a:lstStyle>
-            <a:lvl1pPr>
-              <a:defRPr>
-                <a:solidFill>
-                  <a:schemeClr val="tx1"/>
-                </a:solidFill>
-                <a:latin typeface="Calibri" panose="020F0502020204030204" pitchFamily="34" charset="0"/>
-              </a:defRPr>
-            </a:lvl1pPr>
-            <a:lvl2pPr marL="742950" indent="-285750">
-              <a:defRPr>
-                <a:solidFill>
-                  <a:schemeClr val="tx1"/>
-                </a:solidFill>
-                <a:latin typeface="Calibri" panose="020F0502020204030204" pitchFamily="34" charset="0"/>
-              </a:defRPr>
-            </a:lvl2pPr>
-            <a:lvl3pPr marL="1143000" indent="-228600">
-              <a:defRPr>
-                <a:solidFill>
-                  <a:schemeClr val="tx1"/>
-                </a:solidFill>
-                <a:latin typeface="Calibri" panose="020F0502020204030204" pitchFamily="34" charset="0"/>
-              </a:defRPr>
-            </a:lvl3pPr>
-            <a:lvl4pPr marL="1600200" indent="-228600">
-              <a:defRPr>
-                <a:solidFill>
-                  <a:schemeClr val="tx1"/>
-                </a:solidFill>
-                <a:latin typeface="Calibri" panose="020F0502020204030204" pitchFamily="34" charset="0"/>
-              </a:defRPr>
-            </a:lvl4pPr>
-            <a:lvl5pPr marL="2057400" indent="-228600">
-              <a:defRPr>
-                <a:solidFill>
-                  <a:schemeClr val="tx1"/>
-                </a:solidFill>
-                <a:latin typeface="Calibri" panose="020F0502020204030204" pitchFamily="34" charset="0"/>
-              </a:defRPr>
-            </a:lvl5pPr>
-            <a:lvl6pPr marL="2514600" indent="-228600" eaLnBrk="0" fontAlgn="base" hangingPunct="0">
-              <a:spcBef>
-                <a:spcPct val="0"/>
-              </a:spcBef>
-              <a:spcAft>
-                <a:spcPct val="0"/>
-              </a:spcAft>
-              <a:defRPr>
-                <a:solidFill>
-                  <a:schemeClr val="tx1"/>
-                </a:solidFill>
-                <a:latin typeface="Calibri" panose="020F0502020204030204" pitchFamily="34" charset="0"/>
-              </a:defRPr>
-            </a:lvl6pPr>
-            <a:lvl7pPr marL="2971800" indent="-228600" eaLnBrk="0" fontAlgn="base" hangingPunct="0">
-              <a:spcBef>
-                <a:spcPct val="0"/>
-              </a:spcBef>
-              <a:spcAft>
-                <a:spcPct val="0"/>
-              </a:spcAft>
-              <a:defRPr>
-                <a:solidFill>
-                  <a:schemeClr val="tx1"/>
-                </a:solidFill>
-                <a:latin typeface="Calibri" panose="020F0502020204030204" pitchFamily="34" charset="0"/>
-              </a:defRPr>
-            </a:lvl7pPr>
-            <a:lvl8pPr marL="3429000" indent="-228600" eaLnBrk="0" fontAlgn="base" hangingPunct="0">
-              <a:spcBef>
-                <a:spcPct val="0"/>
-              </a:spcBef>
-              <a:spcAft>
-                <a:spcPct val="0"/>
-              </a:spcAft>
-              <a:defRPr>
-                <a:solidFill>
-                  <a:schemeClr val="tx1"/>
-                </a:solidFill>
-                <a:latin typeface="Calibri" panose="020F0502020204030204" pitchFamily="34" charset="0"/>
-              </a:defRPr>
-            </a:lvl8pPr>
-            <a:lvl9pPr marL="3886200" indent="-228600" eaLnBrk="0" fontAlgn="base" hangingPunct="0">
-              <a:spcBef>
-                <a:spcPct val="0"/>
-              </a:spcBef>
-              <a:spcAft>
-                <a:spcPct val="0"/>
-              </a:spcAft>
-              <a:defRPr>
-                <a:solidFill>
-                  <a:schemeClr val="tx1"/>
-                </a:solidFill>
-                <a:latin typeface="Calibri" panose="020F0502020204030204" pitchFamily="34" charset="0"/>
-              </a:defRPr>
-            </a:lvl9pPr>
-          </a:lstStyle>
-          <a:p>
-            <a:pPr algn="ctr" eaLnBrk="1" hangingPunct="1"/>
-            <a:r>
-              <a:rPr lang="en-US" altLang="en-US" sz="1200" dirty="0">
-                <a:latin typeface="Arial" panose="020B0604020202020204" pitchFamily="34" charset="0"/>
-                <a:ea typeface="Amazon Ember" panose="020B0603020204020204" pitchFamily="34" charset="0"/>
-                <a:cs typeface="Arial" panose="020B0604020202020204" pitchFamily="34" charset="0"/>
-              </a:rPr>
-              <a:t>Workload VPC 2</a:t>
             </a:r>
           </a:p>
         </p:txBody>
@@ -6919,10 +6470,10 @@
           <p:nvPr/>
         </p:nvPicPr>
         <p:blipFill>
-          <a:blip r:embed="rId23">
+          <a:blip r:embed="rId22">
             <a:extLst>
               <a:ext uri="{96DAC541-7B7A-43D3-8B79-37D633B846F1}">
-                <asvg:svgBlip xmlns:asvg="http://schemas.microsoft.com/office/drawing/2016/SVG/main" r:embed="rId24"/>
+                <asvg:svgBlip xmlns:asvg="http://schemas.microsoft.com/office/drawing/2016/SVG/main" r:embed="rId23"/>
               </a:ext>
             </a:extLst>
           </a:blip>
@@ -7355,6 +6906,382 @@
           </a:p>
         </p:txBody>
       </p:sp>
+      <p:sp>
+        <p:nvSpPr>
+          <p:cNvPr id="189" name="Oval 188">
+            <a:extLst>
+              <a:ext uri="{FF2B5EF4-FFF2-40B4-BE49-F238E27FC236}">
+                <a16:creationId xmlns:a16="http://schemas.microsoft.com/office/drawing/2014/main" id="{ACE7ABC3-F18B-45D0-B2CD-FB30E8C64911}"/>
+              </a:ext>
+              <a:ext uri="{C183D7F6-B498-43B3-948B-1728B52AA6E4}">
+                <adec:decorative xmlns:adec="http://schemas.microsoft.com/office/drawing/2017/decorative" val="1"/>
+              </a:ext>
+            </a:extLst>
+          </p:cNvPr>
+          <p:cNvSpPr>
+            <a:spLocks noChangeAspect="1"/>
+          </p:cNvSpPr>
+          <p:nvPr/>
+        </p:nvSpPr>
+        <p:spPr bwMode="gray">
+          <a:xfrm>
+            <a:off x="5876812" y="6844614"/>
+            <a:ext cx="457201" cy="457200"/>
+          </a:xfrm>
+          <a:prstGeom prst="ellipse">
+            <a:avLst/>
+          </a:prstGeom>
+          <a:solidFill>
+            <a:schemeClr val="bg1"/>
+          </a:solidFill>
+          <a:ln w="25400" cap="flat" cmpd="sng" algn="ctr">
+            <a:noFill/>
+            <a:prstDash val="solid"/>
+          </a:ln>
+          <a:effectLst/>
+        </p:spPr>
+        <p:txBody>
+          <a:bodyPr rtlCol="0" anchor="ctr"/>
+          <a:lstStyle/>
+          <a:p>
+            <a:pPr marL="0" marR="0" lvl="0" indent="0" algn="ctr" defTabSz="914400" eaLnBrk="1" fontAlgn="auto" latinLnBrk="0" hangingPunct="1">
+              <a:lnSpc>
+                <a:spcPct val="100000"/>
+              </a:lnSpc>
+              <a:spcBef>
+                <a:spcPts val="0"/>
+              </a:spcBef>
+              <a:spcAft>
+                <a:spcPts val="0"/>
+              </a:spcAft>
+              <a:buClrTx/>
+              <a:buSzTx/>
+              <a:buFontTx/>
+              <a:buNone/>
+              <a:tabLst/>
+              <a:defRPr/>
+            </a:pPr>
+            <a:endParaRPr kumimoji="0" lang="en-US" sz="1800" b="0" i="0" u="none" strike="noStrike" kern="0" cap="none" spc="0" normalizeH="0" baseline="0" noProof="0" dirty="0">
+              <a:ln>
+                <a:noFill/>
+              </a:ln>
+              <a:solidFill>
+                <a:srgbClr val="FFFFFF"/>
+              </a:solidFill>
+              <a:effectLst/>
+              <a:uLnTx/>
+              <a:uFillTx/>
+              <a:latin typeface="Metropolis"/>
+              <a:ea typeface="+mn-ea"/>
+              <a:cs typeface="+mn-cs"/>
+            </a:endParaRPr>
+          </a:p>
+        </p:txBody>
+      </p:sp>
+      <p:sp>
+        <p:nvSpPr>
+          <p:cNvPr id="191" name="TextBox 15">
+            <a:extLst>
+              <a:ext uri="{FF2B5EF4-FFF2-40B4-BE49-F238E27FC236}">
+                <a16:creationId xmlns:a16="http://schemas.microsoft.com/office/drawing/2014/main" id="{88860D2C-98DE-42D1-AE7F-8F28658D9FC9}"/>
+              </a:ext>
+            </a:extLst>
+          </p:cNvPr>
+          <p:cNvSpPr txBox="1">
+            <a:spLocks noChangeArrowheads="1"/>
+          </p:cNvSpPr>
+          <p:nvPr/>
+        </p:nvSpPr>
+        <p:spPr bwMode="auto">
+          <a:xfrm>
+            <a:off x="5378696" y="7319512"/>
+            <a:ext cx="1426282" cy="261610"/>
+          </a:xfrm>
+          <a:prstGeom prst="rect">
+            <a:avLst/>
+          </a:prstGeom>
+          <a:solidFill>
+            <a:schemeClr val="bg1"/>
+          </a:solidFill>
+          <a:ln>
+            <a:noFill/>
+          </a:ln>
+        </p:spPr>
+        <p:txBody>
+          <a:bodyPr wrap="square">
+            <a:spAutoFit/>
+          </a:bodyPr>
+          <a:lstStyle>
+            <a:lvl1pPr>
+              <a:defRPr>
+                <a:solidFill>
+                  <a:schemeClr val="tx1"/>
+                </a:solidFill>
+                <a:latin typeface="Calibri" panose="020F0502020204030204" pitchFamily="34" charset="0"/>
+              </a:defRPr>
+            </a:lvl1pPr>
+            <a:lvl2pPr marL="742950" indent="-285750">
+              <a:defRPr>
+                <a:solidFill>
+                  <a:schemeClr val="tx1"/>
+                </a:solidFill>
+                <a:latin typeface="Calibri" panose="020F0502020204030204" pitchFamily="34" charset="0"/>
+              </a:defRPr>
+            </a:lvl2pPr>
+            <a:lvl3pPr marL="1143000" indent="-228600">
+              <a:defRPr>
+                <a:solidFill>
+                  <a:schemeClr val="tx1"/>
+                </a:solidFill>
+                <a:latin typeface="Calibri" panose="020F0502020204030204" pitchFamily="34" charset="0"/>
+              </a:defRPr>
+            </a:lvl3pPr>
+            <a:lvl4pPr marL="1600200" indent="-228600">
+              <a:defRPr>
+                <a:solidFill>
+                  <a:schemeClr val="tx1"/>
+                </a:solidFill>
+                <a:latin typeface="Calibri" panose="020F0502020204030204" pitchFamily="34" charset="0"/>
+              </a:defRPr>
+            </a:lvl4pPr>
+            <a:lvl5pPr marL="2057400" indent="-228600">
+              <a:defRPr>
+                <a:solidFill>
+                  <a:schemeClr val="tx1"/>
+                </a:solidFill>
+                <a:latin typeface="Calibri" panose="020F0502020204030204" pitchFamily="34" charset="0"/>
+              </a:defRPr>
+            </a:lvl5pPr>
+            <a:lvl6pPr marL="2514600" indent="-228600" eaLnBrk="0" fontAlgn="base" hangingPunct="0">
+              <a:spcBef>
+                <a:spcPct val="0"/>
+              </a:spcBef>
+              <a:spcAft>
+                <a:spcPct val="0"/>
+              </a:spcAft>
+              <a:defRPr>
+                <a:solidFill>
+                  <a:schemeClr val="tx1"/>
+                </a:solidFill>
+                <a:latin typeface="Calibri" panose="020F0502020204030204" pitchFamily="34" charset="0"/>
+              </a:defRPr>
+            </a:lvl6pPr>
+            <a:lvl7pPr marL="2971800" indent="-228600" eaLnBrk="0" fontAlgn="base" hangingPunct="0">
+              <a:spcBef>
+                <a:spcPct val="0"/>
+              </a:spcBef>
+              <a:spcAft>
+                <a:spcPct val="0"/>
+              </a:spcAft>
+              <a:defRPr>
+                <a:solidFill>
+                  <a:schemeClr val="tx1"/>
+                </a:solidFill>
+                <a:latin typeface="Calibri" panose="020F0502020204030204" pitchFamily="34" charset="0"/>
+              </a:defRPr>
+            </a:lvl7pPr>
+            <a:lvl8pPr marL="3429000" indent="-228600" eaLnBrk="0" fontAlgn="base" hangingPunct="0">
+              <a:spcBef>
+                <a:spcPct val="0"/>
+              </a:spcBef>
+              <a:spcAft>
+                <a:spcPct val="0"/>
+              </a:spcAft>
+              <a:defRPr>
+                <a:solidFill>
+                  <a:schemeClr val="tx1"/>
+                </a:solidFill>
+                <a:latin typeface="Calibri" panose="020F0502020204030204" pitchFamily="34" charset="0"/>
+              </a:defRPr>
+            </a:lvl8pPr>
+            <a:lvl9pPr marL="3886200" indent="-228600" eaLnBrk="0" fontAlgn="base" hangingPunct="0">
+              <a:spcBef>
+                <a:spcPct val="0"/>
+              </a:spcBef>
+              <a:spcAft>
+                <a:spcPct val="0"/>
+              </a:spcAft>
+              <a:defRPr>
+                <a:solidFill>
+                  <a:schemeClr val="tx1"/>
+                </a:solidFill>
+                <a:latin typeface="Calibri" panose="020F0502020204030204" pitchFamily="34" charset="0"/>
+              </a:defRPr>
+            </a:lvl9pPr>
+          </a:lstStyle>
+          <a:p>
+            <a:pPr algn="ctr" eaLnBrk="1" hangingPunct="1"/>
+            <a:r>
+              <a:rPr lang="en-US" altLang="en-US" sz="1100" dirty="0">
+                <a:latin typeface="Arial" panose="020B0604020202020204" pitchFamily="34" charset="0"/>
+                <a:ea typeface="Amazon Ember" panose="020B0603020204020204" pitchFamily="34" charset="0"/>
+                <a:cs typeface="Arial" panose="020B0604020202020204" pitchFamily="34" charset="0"/>
+              </a:rPr>
+              <a:t>VPC attachment</a:t>
+            </a:r>
+          </a:p>
+        </p:txBody>
+      </p:sp>
+      <p:pic>
+        <p:nvPicPr>
+          <p:cNvPr id="127" name="Graphic 8">
+            <a:extLst>
+              <a:ext uri="{FF2B5EF4-FFF2-40B4-BE49-F238E27FC236}">
+                <a16:creationId xmlns:a16="http://schemas.microsoft.com/office/drawing/2014/main" id="{B01CF6D7-D23C-410F-8F33-A94A548609C8}"/>
+              </a:ext>
+            </a:extLst>
+          </p:cNvPr>
+          <p:cNvPicPr>
+            <a:picLocks noChangeAspect="1" noChangeArrowheads="1"/>
+          </p:cNvPicPr>
+          <p:nvPr/>
+        </p:nvPicPr>
+        <p:blipFill>
+          <a:blip r:embed="rId24">
+            <a:extLst>
+              <a:ext uri="{96DAC541-7B7A-43D3-8B79-37D633B846F1}">
+                <asvg:svgBlip xmlns:asvg="http://schemas.microsoft.com/office/drawing/2016/SVG/main" r:embed="rId25"/>
+              </a:ext>
+            </a:extLst>
+          </a:blip>
+          <a:srcRect/>
+          <a:stretch/>
+        </p:blipFill>
+        <p:spPr bwMode="auto">
+          <a:xfrm>
+            <a:off x="5863237" y="6891749"/>
+            <a:ext cx="457200" cy="457200"/>
+          </a:xfrm>
+          <a:prstGeom prst="rect">
+            <a:avLst/>
+          </a:prstGeom>
+          <a:noFill/>
+          <a:ln>
+            <a:noFill/>
+          </a:ln>
+          <a:extLst>
+            <a:ext uri="{909E8E84-426E-40DD-AFC4-6F175D3DCCD1}">
+              <a14:hiddenFill xmlns:a14="http://schemas.microsoft.com/office/drawing/2010/main">
+                <a:solidFill>
+                  <a:srgbClr val="FFFFFF"/>
+                </a:solidFill>
+              </a14:hiddenFill>
+            </a:ext>
+            <a:ext uri="{91240B29-F687-4F45-9708-019B960494DF}">
+              <a14:hiddenLine xmlns:a14="http://schemas.microsoft.com/office/drawing/2010/main" w="9525">
+                <a:solidFill>
+                  <a:srgbClr val="000000"/>
+                </a:solidFill>
+                <a:miter lim="800000"/>
+                <a:headEnd/>
+                <a:tailEnd/>
+              </a14:hiddenLine>
+            </a:ext>
+          </a:extLst>
+        </p:spPr>
+      </p:pic>
+      <p:sp>
+        <p:nvSpPr>
+          <p:cNvPr id="248" name="Oval 247">
+            <a:extLst>
+              <a:ext uri="{FF2B5EF4-FFF2-40B4-BE49-F238E27FC236}">
+                <a16:creationId xmlns:a16="http://schemas.microsoft.com/office/drawing/2014/main" id="{6A5B9A15-65BE-4AB7-BB61-897A3C35BDD4}"/>
+              </a:ext>
+              <a:ext uri="{C183D7F6-B498-43B3-948B-1728B52AA6E4}">
+                <adec:decorative xmlns:adec="http://schemas.microsoft.com/office/drawing/2017/decorative" val="1"/>
+              </a:ext>
+            </a:extLst>
+          </p:cNvPr>
+          <p:cNvSpPr>
+            <a:spLocks noChangeAspect="1"/>
+          </p:cNvSpPr>
+          <p:nvPr/>
+        </p:nvSpPr>
+        <p:spPr bwMode="gray">
+          <a:xfrm>
+            <a:off x="9223780" y="6844614"/>
+            <a:ext cx="457201" cy="457200"/>
+          </a:xfrm>
+          <a:prstGeom prst="ellipse">
+            <a:avLst/>
+          </a:prstGeom>
+          <a:solidFill>
+            <a:schemeClr val="bg1"/>
+          </a:solidFill>
+          <a:ln w="25400" cap="flat" cmpd="sng" algn="ctr">
+            <a:noFill/>
+            <a:prstDash val="solid"/>
+          </a:ln>
+          <a:effectLst/>
+        </p:spPr>
+        <p:txBody>
+          <a:bodyPr rtlCol="0" anchor="ctr"/>
+          <a:lstStyle/>
+          <a:p>
+            <a:pPr marL="0" marR="0" lvl="0" indent="0" algn="ctr" defTabSz="914400" eaLnBrk="1" fontAlgn="auto" latinLnBrk="0" hangingPunct="1">
+              <a:lnSpc>
+                <a:spcPct val="100000"/>
+              </a:lnSpc>
+              <a:spcBef>
+                <a:spcPts val="0"/>
+              </a:spcBef>
+              <a:spcAft>
+                <a:spcPts val="0"/>
+              </a:spcAft>
+              <a:buClrTx/>
+              <a:buSzTx/>
+              <a:buFontTx/>
+              <a:buNone/>
+              <a:tabLst/>
+              <a:defRPr/>
+            </a:pPr>
+            <a:endParaRPr kumimoji="0" lang="en-US" sz="1800" b="0" i="0" u="none" strike="noStrike" kern="0" cap="none" spc="0" normalizeH="0" baseline="0" noProof="0" dirty="0">
+              <a:ln>
+                <a:noFill/>
+              </a:ln>
+              <a:solidFill>
+                <a:srgbClr val="FFFFFF"/>
+              </a:solidFill>
+              <a:effectLst/>
+              <a:uLnTx/>
+              <a:uFillTx/>
+              <a:latin typeface="Metropolis"/>
+              <a:ea typeface="+mn-ea"/>
+              <a:cs typeface="+mn-cs"/>
+            </a:endParaRPr>
+          </a:p>
+        </p:txBody>
+      </p:sp>
+      <p:pic>
+        <p:nvPicPr>
+          <p:cNvPr id="2" name="Picture 1">
+            <a:extLst>
+              <a:ext uri="{FF2B5EF4-FFF2-40B4-BE49-F238E27FC236}">
+                <a16:creationId xmlns:a16="http://schemas.microsoft.com/office/drawing/2014/main" id="{DD87B7BE-D4B0-4844-A98A-BA8FA641D625}"/>
+              </a:ext>
+            </a:extLst>
+          </p:cNvPr>
+          <p:cNvPicPr>
+            <a:picLocks noChangeAspect="1"/>
+          </p:cNvPicPr>
+          <p:nvPr/>
+        </p:nvPicPr>
+        <p:blipFill>
+          <a:blip r:embed="rId26"/>
+          <a:stretch>
+            <a:fillRect/>
+          </a:stretch>
+        </p:blipFill>
+        <p:spPr>
+          <a:xfrm>
+            <a:off x="5863256" y="7936220"/>
+            <a:ext cx="457162" cy="438876"/>
+          </a:xfrm>
+          <a:prstGeom prst="rect">
+            <a:avLst/>
+          </a:prstGeom>
+        </p:spPr>
+      </p:pic>
       <p:cxnSp>
         <p:nvCxnSpPr>
           <p:cNvPr id="244" name="Straight Arrow Connector 243">
@@ -7366,15 +7293,15 @@
           </p:cNvPr>
           <p:cNvCxnSpPr>
             <a:cxnSpLocks/>
-            <a:stCxn id="210" idx="0"/>
+            <a:stCxn id="127" idx="0"/>
             <a:endCxn id="89" idx="2"/>
           </p:cNvCxnSpPr>
           <p:nvPr/>
         </p:nvCxnSpPr>
         <p:spPr>
           <a:xfrm flipV="1">
-            <a:off x="6103829" y="6423853"/>
-            <a:ext cx="444" cy="1291095"/>
+            <a:off x="6091837" y="6423853"/>
+            <a:ext cx="0" cy="467896"/>
           </a:xfrm>
           <a:prstGeom prst="straightConnector1">
             <a:avLst/>
@@ -7402,300 +7329,26 @@
           </a:fontRef>
         </p:style>
       </p:cxnSp>
-      <p:sp>
-        <p:nvSpPr>
-          <p:cNvPr id="189" name="Oval 188">
+      <p:cxnSp>
+        <p:nvCxnSpPr>
+          <p:cNvPr id="63" name="Straight Arrow Connector 62">
             <a:extLst>
               <a:ext uri="{FF2B5EF4-FFF2-40B4-BE49-F238E27FC236}">
-                <a16:creationId xmlns:a16="http://schemas.microsoft.com/office/drawing/2014/main" id="{ACE7ABC3-F18B-45D0-B2CD-FB30E8C64911}"/>
-              </a:ext>
-              <a:ext uri="{C183D7F6-B498-43B3-948B-1728B52AA6E4}">
-                <adec:decorative xmlns:adec="http://schemas.microsoft.com/office/drawing/2017/decorative" val="1"/>
-              </a:ext>
-            </a:extLst>
-          </p:cNvPr>
-          <p:cNvSpPr>
-            <a:spLocks noChangeAspect="1"/>
-          </p:cNvSpPr>
-          <p:nvPr/>
-        </p:nvSpPr>
-        <p:spPr bwMode="gray">
-          <a:xfrm>
-            <a:off x="5876812" y="6844614"/>
-            <a:ext cx="457201" cy="457200"/>
-          </a:xfrm>
-          <a:prstGeom prst="ellipse">
-            <a:avLst/>
-          </a:prstGeom>
-          <a:solidFill>
-            <a:schemeClr val="bg1"/>
-          </a:solidFill>
-          <a:ln w="25400" cap="flat" cmpd="sng" algn="ctr">
-            <a:noFill/>
-            <a:prstDash val="solid"/>
-          </a:ln>
-          <a:effectLst/>
-        </p:spPr>
-        <p:txBody>
-          <a:bodyPr rtlCol="0" anchor="ctr"/>
-          <a:lstStyle/>
-          <a:p>
-            <a:pPr marL="0" marR="0" lvl="0" indent="0" algn="ctr" defTabSz="914400" eaLnBrk="1" fontAlgn="auto" latinLnBrk="0" hangingPunct="1">
-              <a:lnSpc>
-                <a:spcPct val="100000"/>
-              </a:lnSpc>
-              <a:spcBef>
-                <a:spcPts val="0"/>
-              </a:spcBef>
-              <a:spcAft>
-                <a:spcPts val="0"/>
-              </a:spcAft>
-              <a:buClrTx/>
-              <a:buSzTx/>
-              <a:buFontTx/>
-              <a:buNone/>
-              <a:tabLst/>
-              <a:defRPr/>
-            </a:pPr>
-            <a:endParaRPr kumimoji="0" lang="en-US" sz="1800" b="0" i="0" u="none" strike="noStrike" kern="0" cap="none" spc="0" normalizeH="0" baseline="0" noProof="0" dirty="0">
-              <a:ln>
-                <a:noFill/>
-              </a:ln>
-              <a:solidFill>
-                <a:srgbClr val="FFFFFF"/>
-              </a:solidFill>
-              <a:effectLst/>
-              <a:uLnTx/>
-              <a:uFillTx/>
-              <a:latin typeface="Metropolis"/>
-              <a:ea typeface="+mn-ea"/>
-              <a:cs typeface="+mn-cs"/>
-            </a:endParaRPr>
-          </a:p>
-        </p:txBody>
-      </p:sp>
-      <p:sp>
-        <p:nvSpPr>
-          <p:cNvPr id="191" name="TextBox 15">
-            <a:extLst>
-              <a:ext uri="{FF2B5EF4-FFF2-40B4-BE49-F238E27FC236}">
-                <a16:creationId xmlns:a16="http://schemas.microsoft.com/office/drawing/2014/main" id="{88860D2C-98DE-42D1-AE7F-8F28658D9FC9}"/>
-              </a:ext>
-            </a:extLst>
-          </p:cNvPr>
-          <p:cNvSpPr txBox="1">
-            <a:spLocks noChangeArrowheads="1"/>
-          </p:cNvSpPr>
-          <p:nvPr/>
-        </p:nvSpPr>
-        <p:spPr bwMode="auto">
-          <a:xfrm>
-            <a:off x="5385773" y="7272377"/>
-            <a:ext cx="1426282" cy="261610"/>
-          </a:xfrm>
-          <a:prstGeom prst="rect">
-            <a:avLst/>
-          </a:prstGeom>
-          <a:solidFill>
-            <a:schemeClr val="bg1"/>
-          </a:solidFill>
-          <a:ln>
-            <a:noFill/>
-          </a:ln>
-        </p:spPr>
-        <p:txBody>
-          <a:bodyPr wrap="square">
-            <a:spAutoFit/>
-          </a:bodyPr>
-          <a:lstStyle>
-            <a:lvl1pPr>
-              <a:defRPr>
-                <a:solidFill>
-                  <a:schemeClr val="tx1"/>
-                </a:solidFill>
-                <a:latin typeface="Calibri" panose="020F0502020204030204" pitchFamily="34" charset="0"/>
-              </a:defRPr>
-            </a:lvl1pPr>
-            <a:lvl2pPr marL="742950" indent="-285750">
-              <a:defRPr>
-                <a:solidFill>
-                  <a:schemeClr val="tx1"/>
-                </a:solidFill>
-                <a:latin typeface="Calibri" panose="020F0502020204030204" pitchFamily="34" charset="0"/>
-              </a:defRPr>
-            </a:lvl2pPr>
-            <a:lvl3pPr marL="1143000" indent="-228600">
-              <a:defRPr>
-                <a:solidFill>
-                  <a:schemeClr val="tx1"/>
-                </a:solidFill>
-                <a:latin typeface="Calibri" panose="020F0502020204030204" pitchFamily="34" charset="0"/>
-              </a:defRPr>
-            </a:lvl3pPr>
-            <a:lvl4pPr marL="1600200" indent="-228600">
-              <a:defRPr>
-                <a:solidFill>
-                  <a:schemeClr val="tx1"/>
-                </a:solidFill>
-                <a:latin typeface="Calibri" panose="020F0502020204030204" pitchFamily="34" charset="0"/>
-              </a:defRPr>
-            </a:lvl4pPr>
-            <a:lvl5pPr marL="2057400" indent="-228600">
-              <a:defRPr>
-                <a:solidFill>
-                  <a:schemeClr val="tx1"/>
-                </a:solidFill>
-                <a:latin typeface="Calibri" panose="020F0502020204030204" pitchFamily="34" charset="0"/>
-              </a:defRPr>
-            </a:lvl5pPr>
-            <a:lvl6pPr marL="2514600" indent="-228600" eaLnBrk="0" fontAlgn="base" hangingPunct="0">
-              <a:spcBef>
-                <a:spcPct val="0"/>
-              </a:spcBef>
-              <a:spcAft>
-                <a:spcPct val="0"/>
-              </a:spcAft>
-              <a:defRPr>
-                <a:solidFill>
-                  <a:schemeClr val="tx1"/>
-                </a:solidFill>
-                <a:latin typeface="Calibri" panose="020F0502020204030204" pitchFamily="34" charset="0"/>
-              </a:defRPr>
-            </a:lvl6pPr>
-            <a:lvl7pPr marL="2971800" indent="-228600" eaLnBrk="0" fontAlgn="base" hangingPunct="0">
-              <a:spcBef>
-                <a:spcPct val="0"/>
-              </a:spcBef>
-              <a:spcAft>
-                <a:spcPct val="0"/>
-              </a:spcAft>
-              <a:defRPr>
-                <a:solidFill>
-                  <a:schemeClr val="tx1"/>
-                </a:solidFill>
-                <a:latin typeface="Calibri" panose="020F0502020204030204" pitchFamily="34" charset="0"/>
-              </a:defRPr>
-            </a:lvl7pPr>
-            <a:lvl8pPr marL="3429000" indent="-228600" eaLnBrk="0" fontAlgn="base" hangingPunct="0">
-              <a:spcBef>
-                <a:spcPct val="0"/>
-              </a:spcBef>
-              <a:spcAft>
-                <a:spcPct val="0"/>
-              </a:spcAft>
-              <a:defRPr>
-                <a:solidFill>
-                  <a:schemeClr val="tx1"/>
-                </a:solidFill>
-                <a:latin typeface="Calibri" panose="020F0502020204030204" pitchFamily="34" charset="0"/>
-              </a:defRPr>
-            </a:lvl8pPr>
-            <a:lvl9pPr marL="3886200" indent="-228600" eaLnBrk="0" fontAlgn="base" hangingPunct="0">
-              <a:spcBef>
-                <a:spcPct val="0"/>
-              </a:spcBef>
-              <a:spcAft>
-                <a:spcPct val="0"/>
-              </a:spcAft>
-              <a:defRPr>
-                <a:solidFill>
-                  <a:schemeClr val="tx1"/>
-                </a:solidFill>
-                <a:latin typeface="Calibri" panose="020F0502020204030204" pitchFamily="34" charset="0"/>
-              </a:defRPr>
-            </a:lvl9pPr>
-          </a:lstStyle>
-          <a:p>
-            <a:pPr algn="ctr" eaLnBrk="1" hangingPunct="1"/>
-            <a:r>
-              <a:rPr lang="en-US" altLang="en-US" sz="1100" dirty="0">
-                <a:latin typeface="Arial" panose="020B0604020202020204" pitchFamily="34" charset="0"/>
-                <a:ea typeface="Amazon Ember" panose="020B0603020204020204" pitchFamily="34" charset="0"/>
-                <a:cs typeface="Arial" panose="020B0604020202020204" pitchFamily="34" charset="0"/>
-              </a:rPr>
-              <a:t>VPC attachment</a:t>
-            </a:r>
-          </a:p>
-        </p:txBody>
-      </p:sp>
-      <p:pic>
-        <p:nvPicPr>
-          <p:cNvPr id="127" name="Graphic 8">
-            <a:extLst>
-              <a:ext uri="{FF2B5EF4-FFF2-40B4-BE49-F238E27FC236}">
-                <a16:creationId xmlns:a16="http://schemas.microsoft.com/office/drawing/2014/main" id="{B01CF6D7-D23C-410F-8F33-A94A548609C8}"/>
-              </a:ext>
-            </a:extLst>
-          </p:cNvPr>
-          <p:cNvPicPr>
-            <a:picLocks noChangeAspect="1" noChangeArrowheads="1"/>
-          </p:cNvPicPr>
-          <p:nvPr/>
-        </p:nvPicPr>
-        <p:blipFill>
-          <a:blip r:embed="rId25">
-            <a:extLst>
-              <a:ext uri="{96DAC541-7B7A-43D3-8B79-37D633B846F1}">
-                <asvg:svgBlip xmlns:asvg="http://schemas.microsoft.com/office/drawing/2016/SVG/main" r:embed="rId26"/>
-              </a:ext>
-            </a:extLst>
-          </a:blip>
-          <a:srcRect/>
-          <a:stretch/>
-        </p:blipFill>
-        <p:spPr bwMode="auto">
-          <a:xfrm>
-            <a:off x="5884817" y="6844614"/>
-            <a:ext cx="457200" cy="457200"/>
-          </a:xfrm>
-          <a:prstGeom prst="rect">
-            <a:avLst/>
-          </a:prstGeom>
-          <a:noFill/>
-          <a:ln>
-            <a:noFill/>
-          </a:ln>
-          <a:extLst>
-            <a:ext uri="{909E8E84-426E-40DD-AFC4-6F175D3DCCD1}">
-              <a14:hiddenFill xmlns:a14="http://schemas.microsoft.com/office/drawing/2010/main">
-                <a:solidFill>
-                  <a:srgbClr val="FFFFFF"/>
-                </a:solidFill>
-              </a14:hiddenFill>
-            </a:ext>
-            <a:ext uri="{91240B29-F687-4F45-9708-019B960494DF}">
-              <a14:hiddenLine xmlns:a14="http://schemas.microsoft.com/office/drawing/2010/main" w="9525">
-                <a:solidFill>
-                  <a:srgbClr val="000000"/>
-                </a:solidFill>
-                <a:miter lim="800000"/>
-                <a:headEnd/>
-                <a:tailEnd/>
-              </a14:hiddenLine>
-            </a:ext>
-          </a:extLst>
-        </p:spPr>
-      </p:pic>
-      <p:cxnSp>
-        <p:nvCxnSpPr>
-          <p:cNvPr id="247" name="Straight Arrow Connector 246">
-            <a:extLst>
-              <a:ext uri="{FF2B5EF4-FFF2-40B4-BE49-F238E27FC236}">
-                <a16:creationId xmlns:a16="http://schemas.microsoft.com/office/drawing/2014/main" id="{4CFFB6AC-850F-4D7E-91D4-402CA9302421}"/>
+                <a16:creationId xmlns:a16="http://schemas.microsoft.com/office/drawing/2014/main" id="{3335DCC6-3B0F-4919-A400-90B9DE743E5E}"/>
               </a:ext>
             </a:extLst>
           </p:cNvPr>
           <p:cNvCxnSpPr>
             <a:cxnSpLocks/>
-            <a:stCxn id="217" idx="0"/>
-            <a:endCxn id="91" idx="2"/>
+            <a:stCxn id="2" idx="0"/>
+            <a:endCxn id="191" idx="2"/>
           </p:cNvCxnSpPr>
           <p:nvPr/>
         </p:nvCxnSpPr>
         <p:spPr>
-          <a:xfrm flipH="1" flipV="1">
-            <a:off x="9459393" y="6423853"/>
-            <a:ext cx="7039" cy="1308313"/>
+          <a:xfrm flipV="1">
+            <a:off x="6091837" y="7581122"/>
+            <a:ext cx="0" cy="355098"/>
           </a:xfrm>
           <a:prstGeom prst="straightConnector1">
             <a:avLst/>
@@ -7725,82 +7378,10 @@
       </p:cxnSp>
       <p:sp>
         <p:nvSpPr>
-          <p:cNvPr id="248" name="Oval 247">
+          <p:cNvPr id="66" name="TextBox 15">
             <a:extLst>
               <a:ext uri="{FF2B5EF4-FFF2-40B4-BE49-F238E27FC236}">
-                <a16:creationId xmlns:a16="http://schemas.microsoft.com/office/drawing/2014/main" id="{6A5B9A15-65BE-4AB7-BB61-897A3C35BDD4}"/>
-              </a:ext>
-              <a:ext uri="{C183D7F6-B498-43B3-948B-1728B52AA6E4}">
-                <adec:decorative xmlns:adec="http://schemas.microsoft.com/office/drawing/2017/decorative" val="1"/>
-              </a:ext>
-            </a:extLst>
-          </p:cNvPr>
-          <p:cNvSpPr>
-            <a:spLocks noChangeAspect="1"/>
-          </p:cNvSpPr>
-          <p:nvPr/>
-        </p:nvSpPr>
-        <p:spPr bwMode="gray">
-          <a:xfrm>
-            <a:off x="9223780" y="6844614"/>
-            <a:ext cx="457201" cy="457200"/>
-          </a:xfrm>
-          <a:prstGeom prst="ellipse">
-            <a:avLst/>
-          </a:prstGeom>
-          <a:solidFill>
-            <a:schemeClr val="bg1"/>
-          </a:solidFill>
-          <a:ln w="25400" cap="flat" cmpd="sng" algn="ctr">
-            <a:noFill/>
-            <a:prstDash val="solid"/>
-          </a:ln>
-          <a:effectLst/>
-        </p:spPr>
-        <p:txBody>
-          <a:bodyPr rtlCol="0" anchor="ctr"/>
-          <a:lstStyle/>
-          <a:p>
-            <a:pPr marL="0" marR="0" lvl="0" indent="0" algn="ctr" defTabSz="914400" eaLnBrk="1" fontAlgn="auto" latinLnBrk="0" hangingPunct="1">
-              <a:lnSpc>
-                <a:spcPct val="100000"/>
-              </a:lnSpc>
-              <a:spcBef>
-                <a:spcPts val="0"/>
-              </a:spcBef>
-              <a:spcAft>
-                <a:spcPts val="0"/>
-              </a:spcAft>
-              <a:buClrTx/>
-              <a:buSzTx/>
-              <a:buFontTx/>
-              <a:buNone/>
-              <a:tabLst/>
-              <a:defRPr/>
-            </a:pPr>
-            <a:endParaRPr kumimoji="0" lang="en-US" sz="1800" b="0" i="0" u="none" strike="noStrike" kern="0" cap="none" spc="0" normalizeH="0" baseline="0" noProof="0" dirty="0">
-              <a:ln>
-                <a:noFill/>
-              </a:ln>
-              <a:solidFill>
-                <a:srgbClr val="FFFFFF"/>
-              </a:solidFill>
-              <a:effectLst/>
-              <a:uLnTx/>
-              <a:uFillTx/>
-              <a:latin typeface="Metropolis"/>
-              <a:ea typeface="+mn-ea"/>
-              <a:cs typeface="+mn-cs"/>
-            </a:endParaRPr>
-          </a:p>
-        </p:txBody>
-      </p:sp>
-      <p:sp>
-        <p:nvSpPr>
-          <p:cNvPr id="249" name="TextBox 15">
-            <a:extLst>
-              <a:ext uri="{FF2B5EF4-FFF2-40B4-BE49-F238E27FC236}">
-                <a16:creationId xmlns:a16="http://schemas.microsoft.com/office/drawing/2014/main" id="{91D3C83C-C1AF-4040-A818-0AD922E75EA2}"/>
+                <a16:creationId xmlns:a16="http://schemas.microsoft.com/office/drawing/2014/main" id="{B9A38EAF-9A8F-489D-B966-BC551BBF267E}"/>
               </a:ext>
             </a:extLst>
           </p:cNvPr>
@@ -7811,7 +7392,387 @@
         </p:nvSpPr>
         <p:spPr bwMode="auto">
           <a:xfrm>
-            <a:off x="8762731" y="7274966"/>
+            <a:off x="8760262" y="6144545"/>
+            <a:ext cx="1426282" cy="261610"/>
+          </a:xfrm>
+          <a:prstGeom prst="rect">
+            <a:avLst/>
+          </a:prstGeom>
+          <a:noFill/>
+          <a:ln>
+            <a:noFill/>
+          </a:ln>
+          <a:extLst>
+            <a:ext uri="{909E8E84-426E-40DD-AFC4-6F175D3DCCD1}">
+              <a14:hiddenFill xmlns:a14="http://schemas.microsoft.com/office/drawing/2010/main">
+                <a:solidFill>
+                  <a:srgbClr val="FFFFFF"/>
+                </a:solidFill>
+              </a14:hiddenFill>
+            </a:ext>
+            <a:ext uri="{91240B29-F687-4F45-9708-019B960494DF}">
+              <a14:hiddenLine xmlns:a14="http://schemas.microsoft.com/office/drawing/2010/main" w="9525">
+                <a:solidFill>
+                  <a:srgbClr val="000000"/>
+                </a:solidFill>
+                <a:miter lim="800000"/>
+                <a:headEnd/>
+                <a:tailEnd/>
+              </a14:hiddenLine>
+            </a:ext>
+          </a:extLst>
+        </p:spPr>
+        <p:txBody>
+          <a:bodyPr wrap="square">
+            <a:spAutoFit/>
+          </a:bodyPr>
+          <a:lstStyle>
+            <a:lvl1pPr>
+              <a:defRPr>
+                <a:solidFill>
+                  <a:schemeClr val="tx1"/>
+                </a:solidFill>
+                <a:latin typeface="Calibri" panose="020F0502020204030204" pitchFamily="34" charset="0"/>
+              </a:defRPr>
+            </a:lvl1pPr>
+            <a:lvl2pPr marL="742950" indent="-285750">
+              <a:defRPr>
+                <a:solidFill>
+                  <a:schemeClr val="tx1"/>
+                </a:solidFill>
+                <a:latin typeface="Calibri" panose="020F0502020204030204" pitchFamily="34" charset="0"/>
+              </a:defRPr>
+            </a:lvl2pPr>
+            <a:lvl3pPr marL="1143000" indent="-228600">
+              <a:defRPr>
+                <a:solidFill>
+                  <a:schemeClr val="tx1"/>
+                </a:solidFill>
+                <a:latin typeface="Calibri" panose="020F0502020204030204" pitchFamily="34" charset="0"/>
+              </a:defRPr>
+            </a:lvl3pPr>
+            <a:lvl4pPr marL="1600200" indent="-228600">
+              <a:defRPr>
+                <a:solidFill>
+                  <a:schemeClr val="tx1"/>
+                </a:solidFill>
+                <a:latin typeface="Calibri" panose="020F0502020204030204" pitchFamily="34" charset="0"/>
+              </a:defRPr>
+            </a:lvl4pPr>
+            <a:lvl5pPr marL="2057400" indent="-228600">
+              <a:defRPr>
+                <a:solidFill>
+                  <a:schemeClr val="tx1"/>
+                </a:solidFill>
+                <a:latin typeface="Calibri" panose="020F0502020204030204" pitchFamily="34" charset="0"/>
+              </a:defRPr>
+            </a:lvl5pPr>
+            <a:lvl6pPr marL="2514600" indent="-228600" eaLnBrk="0" fontAlgn="base" hangingPunct="0">
+              <a:spcBef>
+                <a:spcPct val="0"/>
+              </a:spcBef>
+              <a:spcAft>
+                <a:spcPct val="0"/>
+              </a:spcAft>
+              <a:defRPr>
+                <a:solidFill>
+                  <a:schemeClr val="tx1"/>
+                </a:solidFill>
+                <a:latin typeface="Calibri" panose="020F0502020204030204" pitchFamily="34" charset="0"/>
+              </a:defRPr>
+            </a:lvl6pPr>
+            <a:lvl7pPr marL="2971800" indent="-228600" eaLnBrk="0" fontAlgn="base" hangingPunct="0">
+              <a:spcBef>
+                <a:spcPct val="0"/>
+              </a:spcBef>
+              <a:spcAft>
+                <a:spcPct val="0"/>
+              </a:spcAft>
+              <a:defRPr>
+                <a:solidFill>
+                  <a:schemeClr val="tx1"/>
+                </a:solidFill>
+                <a:latin typeface="Calibri" panose="020F0502020204030204" pitchFamily="34" charset="0"/>
+              </a:defRPr>
+            </a:lvl7pPr>
+            <a:lvl8pPr marL="3429000" indent="-228600" eaLnBrk="0" fontAlgn="base" hangingPunct="0">
+              <a:spcBef>
+                <a:spcPct val="0"/>
+              </a:spcBef>
+              <a:spcAft>
+                <a:spcPct val="0"/>
+              </a:spcAft>
+              <a:defRPr>
+                <a:solidFill>
+                  <a:schemeClr val="tx1"/>
+                </a:solidFill>
+                <a:latin typeface="Calibri" panose="020F0502020204030204" pitchFamily="34" charset="0"/>
+              </a:defRPr>
+            </a:lvl8pPr>
+            <a:lvl9pPr marL="3886200" indent="-228600" eaLnBrk="0" fontAlgn="base" hangingPunct="0">
+              <a:spcBef>
+                <a:spcPct val="0"/>
+              </a:spcBef>
+              <a:spcAft>
+                <a:spcPct val="0"/>
+              </a:spcAft>
+              <a:defRPr>
+                <a:solidFill>
+                  <a:schemeClr val="tx1"/>
+                </a:solidFill>
+                <a:latin typeface="Calibri" panose="020F0502020204030204" pitchFamily="34" charset="0"/>
+              </a:defRPr>
+            </a:lvl9pPr>
+          </a:lstStyle>
+          <a:p>
+            <a:pPr algn="ctr" eaLnBrk="1" hangingPunct="1"/>
+            <a:r>
+              <a:rPr lang="en-US" altLang="en-US" sz="1100" dirty="0">
+                <a:latin typeface="Arial" panose="020B0604020202020204" pitchFamily="34" charset="0"/>
+                <a:ea typeface="Amazon Ember" panose="020B0603020204020204" pitchFamily="34" charset="0"/>
+                <a:cs typeface="Arial" panose="020B0604020202020204" pitchFamily="34" charset="0"/>
+              </a:rPr>
+              <a:t>Segment network 2</a:t>
+            </a:r>
+          </a:p>
+        </p:txBody>
+      </p:sp>
+      <p:pic>
+        <p:nvPicPr>
+          <p:cNvPr id="67" name="Graphic 6">
+            <a:extLst>
+              <a:ext uri="{FF2B5EF4-FFF2-40B4-BE49-F238E27FC236}">
+                <a16:creationId xmlns:a16="http://schemas.microsoft.com/office/drawing/2014/main" id="{B5690A8B-7E6C-4C0D-A7F8-AEB71D9000FA}"/>
+              </a:ext>
+            </a:extLst>
+          </p:cNvPr>
+          <p:cNvPicPr>
+            <a:picLocks noChangeAspect="1" noChangeArrowheads="1"/>
+          </p:cNvPicPr>
+          <p:nvPr/>
+        </p:nvPicPr>
+        <p:blipFill>
+          <a:blip r:embed="rId13">
+            <a:extLst>
+              <a:ext uri="{96DAC541-7B7A-43D3-8B79-37D633B846F1}">
+                <asvg:svgBlip xmlns:asvg="http://schemas.microsoft.com/office/drawing/2016/SVG/main" r:embed="rId14"/>
+              </a:ext>
+            </a:extLst>
+          </a:blip>
+          <a:srcRect/>
+          <a:stretch/>
+        </p:blipFill>
+        <p:spPr bwMode="auto">
+          <a:xfrm>
+            <a:off x="9244803" y="5692237"/>
+            <a:ext cx="457200" cy="457200"/>
+          </a:xfrm>
+          <a:prstGeom prst="rect">
+            <a:avLst/>
+          </a:prstGeom>
+          <a:noFill/>
+          <a:ln>
+            <a:noFill/>
+          </a:ln>
+          <a:extLst>
+            <a:ext uri="{909E8E84-426E-40DD-AFC4-6F175D3DCCD1}">
+              <a14:hiddenFill xmlns:a14="http://schemas.microsoft.com/office/drawing/2010/main">
+                <a:solidFill>
+                  <a:srgbClr val="FFFFFF"/>
+                </a:solidFill>
+              </a14:hiddenFill>
+            </a:ext>
+            <a:ext uri="{91240B29-F687-4F45-9708-019B960494DF}">
+              <a14:hiddenLine xmlns:a14="http://schemas.microsoft.com/office/drawing/2010/main" w="9525">
+                <a:solidFill>
+                  <a:srgbClr val="000000"/>
+                </a:solidFill>
+                <a:miter lim="800000"/>
+                <a:headEnd/>
+                <a:tailEnd/>
+              </a14:hiddenLine>
+            </a:ext>
+          </a:extLst>
+        </p:spPr>
+      </p:pic>
+      <p:sp>
+        <p:nvSpPr>
+          <p:cNvPr id="68" name="TextBox 9">
+            <a:extLst>
+              <a:ext uri="{FF2B5EF4-FFF2-40B4-BE49-F238E27FC236}">
+                <a16:creationId xmlns:a16="http://schemas.microsoft.com/office/drawing/2014/main" id="{3E67B654-711E-49E6-A9ED-94A8B17203A7}"/>
+              </a:ext>
+            </a:extLst>
+          </p:cNvPr>
+          <p:cNvSpPr txBox="1">
+            <a:spLocks noChangeArrowheads="1"/>
+          </p:cNvSpPr>
+          <p:nvPr/>
+        </p:nvSpPr>
+        <p:spPr bwMode="auto">
+          <a:xfrm>
+            <a:off x="8760262" y="8378844"/>
+            <a:ext cx="1426282" cy="276999"/>
+          </a:xfrm>
+          <a:prstGeom prst="rect">
+            <a:avLst/>
+          </a:prstGeom>
+          <a:noFill/>
+          <a:ln>
+            <a:noFill/>
+          </a:ln>
+          <a:extLst>
+            <a:ext uri="{909E8E84-426E-40DD-AFC4-6F175D3DCCD1}">
+              <a14:hiddenFill xmlns:a14="http://schemas.microsoft.com/office/drawing/2010/main">
+                <a:solidFill>
+                  <a:srgbClr val="FFFFFF"/>
+                </a:solidFill>
+              </a14:hiddenFill>
+            </a:ext>
+            <a:ext uri="{91240B29-F687-4F45-9708-019B960494DF}">
+              <a14:hiddenLine xmlns:a14="http://schemas.microsoft.com/office/drawing/2010/main" w="9525">
+                <a:solidFill>
+                  <a:srgbClr val="000000"/>
+                </a:solidFill>
+                <a:miter lim="800000"/>
+                <a:headEnd/>
+                <a:tailEnd/>
+              </a14:hiddenLine>
+            </a:ext>
+          </a:extLst>
+        </p:spPr>
+        <p:txBody>
+          <a:bodyPr wrap="square">
+            <a:spAutoFit/>
+          </a:bodyPr>
+          <a:lstStyle>
+            <a:lvl1pPr>
+              <a:defRPr>
+                <a:solidFill>
+                  <a:schemeClr val="tx1"/>
+                </a:solidFill>
+                <a:latin typeface="Calibri" panose="020F0502020204030204" pitchFamily="34" charset="0"/>
+              </a:defRPr>
+            </a:lvl1pPr>
+            <a:lvl2pPr marL="742950" indent="-285750">
+              <a:defRPr>
+                <a:solidFill>
+                  <a:schemeClr val="tx1"/>
+                </a:solidFill>
+                <a:latin typeface="Calibri" panose="020F0502020204030204" pitchFamily="34" charset="0"/>
+              </a:defRPr>
+            </a:lvl2pPr>
+            <a:lvl3pPr marL="1143000" indent="-228600">
+              <a:defRPr>
+                <a:solidFill>
+                  <a:schemeClr val="tx1"/>
+                </a:solidFill>
+                <a:latin typeface="Calibri" panose="020F0502020204030204" pitchFamily="34" charset="0"/>
+              </a:defRPr>
+            </a:lvl3pPr>
+            <a:lvl4pPr marL="1600200" indent="-228600">
+              <a:defRPr>
+                <a:solidFill>
+                  <a:schemeClr val="tx1"/>
+                </a:solidFill>
+                <a:latin typeface="Calibri" panose="020F0502020204030204" pitchFamily="34" charset="0"/>
+              </a:defRPr>
+            </a:lvl4pPr>
+            <a:lvl5pPr marL="2057400" indent="-228600">
+              <a:defRPr>
+                <a:solidFill>
+                  <a:schemeClr val="tx1"/>
+                </a:solidFill>
+                <a:latin typeface="Calibri" panose="020F0502020204030204" pitchFamily="34" charset="0"/>
+              </a:defRPr>
+            </a:lvl5pPr>
+            <a:lvl6pPr marL="2514600" indent="-228600" eaLnBrk="0" fontAlgn="base" hangingPunct="0">
+              <a:spcBef>
+                <a:spcPct val="0"/>
+              </a:spcBef>
+              <a:spcAft>
+                <a:spcPct val="0"/>
+              </a:spcAft>
+              <a:defRPr>
+                <a:solidFill>
+                  <a:schemeClr val="tx1"/>
+                </a:solidFill>
+                <a:latin typeface="Calibri" panose="020F0502020204030204" pitchFamily="34" charset="0"/>
+              </a:defRPr>
+            </a:lvl6pPr>
+            <a:lvl7pPr marL="2971800" indent="-228600" eaLnBrk="0" fontAlgn="base" hangingPunct="0">
+              <a:spcBef>
+                <a:spcPct val="0"/>
+              </a:spcBef>
+              <a:spcAft>
+                <a:spcPct val="0"/>
+              </a:spcAft>
+              <a:defRPr>
+                <a:solidFill>
+                  <a:schemeClr val="tx1"/>
+                </a:solidFill>
+                <a:latin typeface="Calibri" panose="020F0502020204030204" pitchFamily="34" charset="0"/>
+              </a:defRPr>
+            </a:lvl7pPr>
+            <a:lvl8pPr marL="3429000" indent="-228600" eaLnBrk="0" fontAlgn="base" hangingPunct="0">
+              <a:spcBef>
+                <a:spcPct val="0"/>
+              </a:spcBef>
+              <a:spcAft>
+                <a:spcPct val="0"/>
+              </a:spcAft>
+              <a:defRPr>
+                <a:solidFill>
+                  <a:schemeClr val="tx1"/>
+                </a:solidFill>
+                <a:latin typeface="Calibri" panose="020F0502020204030204" pitchFamily="34" charset="0"/>
+              </a:defRPr>
+            </a:lvl8pPr>
+            <a:lvl9pPr marL="3886200" indent="-228600" eaLnBrk="0" fontAlgn="base" hangingPunct="0">
+              <a:spcBef>
+                <a:spcPct val="0"/>
+              </a:spcBef>
+              <a:spcAft>
+                <a:spcPct val="0"/>
+              </a:spcAft>
+              <a:defRPr>
+                <a:solidFill>
+                  <a:schemeClr val="tx1"/>
+                </a:solidFill>
+                <a:latin typeface="Calibri" panose="020F0502020204030204" pitchFamily="34" charset="0"/>
+              </a:defRPr>
+            </a:lvl9pPr>
+          </a:lstStyle>
+          <a:p>
+            <a:pPr algn="ctr" eaLnBrk="1" hangingPunct="1"/>
+            <a:r>
+              <a:rPr lang="en-US" altLang="en-US" sz="1200" dirty="0">
+                <a:latin typeface="Arial" panose="020B0604020202020204" pitchFamily="34" charset="0"/>
+                <a:ea typeface="Amazon Ember" panose="020B0603020204020204" pitchFamily="34" charset="0"/>
+                <a:cs typeface="Arial" panose="020B0604020202020204" pitchFamily="34" charset="0"/>
+              </a:rPr>
+              <a:t>Workload VPC 2</a:t>
+            </a:r>
+          </a:p>
+        </p:txBody>
+      </p:sp>
+      <p:sp>
+        <p:nvSpPr>
+          <p:cNvPr id="69" name="TextBox 15">
+            <a:extLst>
+              <a:ext uri="{FF2B5EF4-FFF2-40B4-BE49-F238E27FC236}">
+                <a16:creationId xmlns:a16="http://schemas.microsoft.com/office/drawing/2014/main" id="{7A5B622E-7849-4170-8FC0-C75301E50343}"/>
+              </a:ext>
+            </a:extLst>
+          </p:cNvPr>
+          <p:cNvSpPr txBox="1">
+            <a:spLocks noChangeArrowheads="1"/>
+          </p:cNvSpPr>
+          <p:nvPr/>
+        </p:nvSpPr>
+        <p:spPr bwMode="auto">
+          <a:xfrm>
+            <a:off x="8760262" y="7301814"/>
             <a:ext cx="1426282" cy="261610"/>
           </a:xfrm>
           <a:prstGeom prst="rect">
@@ -7941,10 +7902,10 @@
       </p:sp>
       <p:pic>
         <p:nvPicPr>
-          <p:cNvPr id="250" name="Graphic 8">
+          <p:cNvPr id="70" name="Graphic 8">
             <a:extLst>
               <a:ext uri="{FF2B5EF4-FFF2-40B4-BE49-F238E27FC236}">
-                <a16:creationId xmlns:a16="http://schemas.microsoft.com/office/drawing/2014/main" id="{65A770F0-9FB1-47E5-8CA8-7BBEE231CE55}"/>
+                <a16:creationId xmlns:a16="http://schemas.microsoft.com/office/drawing/2014/main" id="{3245DD90-5265-4D8A-BEC2-D033CAD00DE8}"/>
               </a:ext>
             </a:extLst>
           </p:cNvPr>
@@ -7954,10 +7915,10 @@
           <p:nvPr/>
         </p:nvPicPr>
         <p:blipFill>
-          <a:blip r:embed="rId25">
+          <a:blip r:embed="rId24">
             <a:extLst>
               <a:ext uri="{96DAC541-7B7A-43D3-8B79-37D633B846F1}">
-                <asvg:svgBlip xmlns:asvg="http://schemas.microsoft.com/office/drawing/2016/SVG/main" r:embed="rId26"/>
+                <asvg:svgBlip xmlns:asvg="http://schemas.microsoft.com/office/drawing/2016/SVG/main" r:embed="rId25"/>
               </a:ext>
             </a:extLst>
           </a:blip>
@@ -7966,7 +7927,7 @@
         </p:blipFill>
         <p:spPr bwMode="auto">
           <a:xfrm>
-            <a:off x="9239788" y="6844614"/>
+            <a:off x="9244803" y="6874051"/>
             <a:ext cx="457200" cy="457200"/>
           </a:xfrm>
           <a:prstGeom prst="rect">
@@ -7997,6 +7958,130 @@
           </a:extLst>
         </p:spPr>
       </p:pic>
+      <p:pic>
+        <p:nvPicPr>
+          <p:cNvPr id="71" name="Picture 70">
+            <a:extLst>
+              <a:ext uri="{FF2B5EF4-FFF2-40B4-BE49-F238E27FC236}">
+                <a16:creationId xmlns:a16="http://schemas.microsoft.com/office/drawing/2014/main" id="{EF0FA4AE-55B6-4C7E-806C-90CC65274BC1}"/>
+              </a:ext>
+            </a:extLst>
+          </p:cNvPr>
+          <p:cNvPicPr>
+            <a:picLocks noChangeAspect="1"/>
+          </p:cNvPicPr>
+          <p:nvPr/>
+        </p:nvPicPr>
+        <p:blipFill>
+          <a:blip r:embed="rId26"/>
+          <a:stretch>
+            <a:fillRect/>
+          </a:stretch>
+        </p:blipFill>
+        <p:spPr>
+          <a:xfrm>
+            <a:off x="9244822" y="7918522"/>
+            <a:ext cx="457162" cy="438876"/>
+          </a:xfrm>
+          <a:prstGeom prst="rect">
+            <a:avLst/>
+          </a:prstGeom>
+        </p:spPr>
+      </p:pic>
+      <p:cxnSp>
+        <p:nvCxnSpPr>
+          <p:cNvPr id="72" name="Straight Arrow Connector 71">
+            <a:extLst>
+              <a:ext uri="{FF2B5EF4-FFF2-40B4-BE49-F238E27FC236}">
+                <a16:creationId xmlns:a16="http://schemas.microsoft.com/office/drawing/2014/main" id="{3DFDD31C-72C8-4C66-8005-DF68BD8749FA}"/>
+              </a:ext>
+            </a:extLst>
+          </p:cNvPr>
+          <p:cNvCxnSpPr>
+            <a:cxnSpLocks/>
+            <a:stCxn id="70" idx="0"/>
+            <a:endCxn id="66" idx="2"/>
+          </p:cNvCxnSpPr>
+          <p:nvPr/>
+        </p:nvCxnSpPr>
+        <p:spPr>
+          <a:xfrm flipV="1">
+            <a:off x="9473403" y="6406155"/>
+            <a:ext cx="0" cy="467896"/>
+          </a:xfrm>
+          <a:prstGeom prst="straightConnector1">
+            <a:avLst/>
+          </a:prstGeom>
+          <a:ln w="12700">
+            <a:solidFill>
+              <a:schemeClr val="tx2"/>
+            </a:solidFill>
+            <a:headEnd type="arrow" w="med" len="sm"/>
+            <a:tailEnd type="none" w="med" len="sm"/>
+          </a:ln>
+        </p:spPr>
+        <p:style>
+          <a:lnRef idx="1">
+            <a:schemeClr val="accent1"/>
+          </a:lnRef>
+          <a:fillRef idx="0">
+            <a:schemeClr val="accent1"/>
+          </a:fillRef>
+          <a:effectRef idx="0">
+            <a:schemeClr val="accent1"/>
+          </a:effectRef>
+          <a:fontRef idx="minor">
+            <a:schemeClr val="tx1"/>
+          </a:fontRef>
+        </p:style>
+      </p:cxnSp>
+      <p:cxnSp>
+        <p:nvCxnSpPr>
+          <p:cNvPr id="73" name="Straight Arrow Connector 72">
+            <a:extLst>
+              <a:ext uri="{FF2B5EF4-FFF2-40B4-BE49-F238E27FC236}">
+                <a16:creationId xmlns:a16="http://schemas.microsoft.com/office/drawing/2014/main" id="{B5A5E401-CAB9-4940-AF92-B2D1CB3ED191}"/>
+              </a:ext>
+            </a:extLst>
+          </p:cNvPr>
+          <p:cNvCxnSpPr>
+            <a:cxnSpLocks/>
+            <a:stCxn id="71" idx="0"/>
+            <a:endCxn id="69" idx="2"/>
+          </p:cNvCxnSpPr>
+          <p:nvPr/>
+        </p:nvCxnSpPr>
+        <p:spPr>
+          <a:xfrm flipV="1">
+            <a:off x="9473403" y="7563424"/>
+            <a:ext cx="0" cy="355098"/>
+          </a:xfrm>
+          <a:prstGeom prst="straightConnector1">
+            <a:avLst/>
+          </a:prstGeom>
+          <a:ln w="12700">
+            <a:solidFill>
+              <a:schemeClr val="tx2"/>
+            </a:solidFill>
+            <a:headEnd type="arrow" w="med" len="sm"/>
+            <a:tailEnd type="none" w="med" len="sm"/>
+          </a:ln>
+        </p:spPr>
+        <p:style>
+          <a:lnRef idx="1">
+            <a:schemeClr val="accent1"/>
+          </a:lnRef>
+          <a:fillRef idx="0">
+            <a:schemeClr val="accent1"/>
+          </a:fillRef>
+          <a:effectRef idx="0">
+            <a:schemeClr val="accent1"/>
+          </a:effectRef>
+          <a:fontRef idx="minor">
+            <a:schemeClr val="tx1"/>
+          </a:fontRef>
+        </p:style>
+      </p:cxnSp>
     </p:spTree>
     <p:extLst>
       <p:ext uri="{BB962C8B-B14F-4D97-AF65-F5344CB8AC3E}">

</xml_diff>

<commit_message>
typo fix in diagram
</commit_message>
<xml_diff>
--- a/docs/deployment_guide/images/architecture_diagram.pptx
+++ b/docs/deployment_guide/images/architecture_diagram.pptx
@@ -5825,14 +5825,14 @@
               <a:defRPr/>
             </a:pPr>
             <a:r>
-              <a:rPr lang="en-US" sz="1200" dirty="0" err="1">
+              <a:rPr lang="en-US" sz="1200">
                 <a:solidFill>
                   <a:srgbClr val="5A6B86"/>
                 </a:solidFill>
                 <a:latin typeface="Arial" panose="020B0604020202020204" pitchFamily="34" charset="0"/>
                 <a:cs typeface="Arial" panose="020B0604020202020204" pitchFamily="34" charset="0"/>
               </a:rPr>
-              <a:t>Vmware</a:t>
+              <a:t>VMware </a:t>
             </a:r>
             <a:r>
               <a:rPr lang="en-US" sz="1200" dirty="0">
@@ -5842,7 +5842,7 @@
                 <a:latin typeface="Arial" panose="020B0604020202020204" pitchFamily="34" charset="0"/>
                 <a:cs typeface="Arial" panose="020B0604020202020204" pitchFamily="34" charset="0"/>
               </a:rPr>
-              <a:t> SD-WAN</a:t>
+              <a:t>SD-WAN</a:t>
             </a:r>
           </a:p>
           <a:p>

</xml_diff>